<commit_message>
Update the code and slides.
</commit_message>
<xml_diff>
--- a/slides/Intermdiate_Python_MiCM_slides_2023.pptx
+++ b/slides/Intermdiate_Python_MiCM_slides_2023.pptx
@@ -129,7 +129,7 @@
 <file path=ppt/revisionInfo.xml><?xml version="1.0" encoding="utf-8"?>
 <p1510:revInfo xmlns:a="http://schemas.openxmlformats.org/drawingml/2006/main" xmlns:r="http://schemas.openxmlformats.org/officeDocument/2006/relationships" xmlns:p1510="http://schemas.microsoft.com/office/powerpoint/2015/10/main">
   <p1510:revLst>
-    <p1510:client id="{2BA1779F-04C8-E54A-8EF8-891D9A825069}" v="8" dt="2023-10-30T15:20:25.367"/>
+    <p1510:client id="{2BA1779F-04C8-E54A-8EF8-891D9A825069}" v="26" dt="2023-10-31T11:52:56.490"/>
   </p1510:revLst>
 </p1510:revInfo>
 </file>
@@ -2489,7 +2489,7 @@
   <pc:docChgLst>
     <pc:chgData name="Benjamin Rudski" userId="7f27de5a-3504-4373-b72f-f1b4087044b9" providerId="ADAL" clId="{2BA1779F-04C8-E54A-8EF8-891D9A825069}"/>
     <pc:docChg chg="undo redo custSel addSld modSld">
-      <pc:chgData name="Benjamin Rudski" userId="7f27de5a-3504-4373-b72f-f1b4087044b9" providerId="ADAL" clId="{2BA1779F-04C8-E54A-8EF8-891D9A825069}" dt="2023-10-30T15:34:16.350" v="2216" actId="20577"/>
+      <pc:chgData name="Benjamin Rudski" userId="7f27de5a-3504-4373-b72f-f1b4087044b9" providerId="ADAL" clId="{2BA1779F-04C8-E54A-8EF8-891D9A825069}" dt="2023-10-31T11:52:56.490" v="2309"/>
       <pc:docMkLst>
         <pc:docMk/>
       </pc:docMkLst>
@@ -2568,8 +2568,8 @@
           </ac:spMkLst>
         </pc:spChg>
       </pc:sldChg>
-      <pc:sldChg chg="addSp delSp modSp mod">
-        <pc:chgData name="Benjamin Rudski" userId="7f27de5a-3504-4373-b72f-f1b4087044b9" providerId="ADAL" clId="{2BA1779F-04C8-E54A-8EF8-891D9A825069}" dt="2023-10-30T15:13:46.662" v="1045" actId="20577"/>
+      <pc:sldChg chg="addSp delSp modSp mod modAnim">
+        <pc:chgData name="Benjamin Rudski" userId="7f27de5a-3504-4373-b72f-f1b4087044b9" providerId="ADAL" clId="{2BA1779F-04C8-E54A-8EF8-891D9A825069}" dt="2023-10-31T11:52:56.490" v="2309"/>
         <pc:sldMkLst>
           <pc:docMk/>
           <pc:sldMk cId="802321671" sldId="335"/>
@@ -2639,8 +2639,8 @@
           </ac:graphicFrameMkLst>
         </pc:graphicFrameChg>
       </pc:sldChg>
-      <pc:sldChg chg="modSp new mod">
-        <pc:chgData name="Benjamin Rudski" userId="7f27de5a-3504-4373-b72f-f1b4087044b9" providerId="ADAL" clId="{2BA1779F-04C8-E54A-8EF8-891D9A825069}" dt="2023-10-30T15:14:59.547" v="1275" actId="20577"/>
+      <pc:sldChg chg="modSp new mod modAnim">
+        <pc:chgData name="Benjamin Rudski" userId="7f27de5a-3504-4373-b72f-f1b4087044b9" providerId="ADAL" clId="{2BA1779F-04C8-E54A-8EF8-891D9A825069}" dt="2023-10-31T11:51:03.637" v="2296"/>
         <pc:sldMkLst>
           <pc:docMk/>
           <pc:sldMk cId="254856680" sldId="341"/>
@@ -2662,8 +2662,8 @@
           </ac:spMkLst>
         </pc:spChg>
       </pc:sldChg>
-      <pc:sldChg chg="modSp new mod">
-        <pc:chgData name="Benjamin Rudski" userId="7f27de5a-3504-4373-b72f-f1b4087044b9" providerId="ADAL" clId="{2BA1779F-04C8-E54A-8EF8-891D9A825069}" dt="2023-10-30T15:32:04.747" v="1713" actId="20577"/>
+      <pc:sldChg chg="modSp new mod modAnim">
+        <pc:chgData name="Benjamin Rudski" userId="7f27de5a-3504-4373-b72f-f1b4087044b9" providerId="ADAL" clId="{2BA1779F-04C8-E54A-8EF8-891D9A825069}" dt="2023-10-31T11:51:18.786" v="2298"/>
         <pc:sldMkLst>
           <pc:docMk/>
           <pc:sldMk cId="1661681403" sldId="342"/>
@@ -2677,7 +2677,7 @@
           </ac:spMkLst>
         </pc:spChg>
         <pc:spChg chg="mod">
-          <ac:chgData name="Benjamin Rudski" userId="7f27de5a-3504-4373-b72f-f1b4087044b9" providerId="ADAL" clId="{2BA1779F-04C8-E54A-8EF8-891D9A825069}" dt="2023-10-30T15:32:04.747" v="1713" actId="20577"/>
+          <ac:chgData name="Benjamin Rudski" userId="7f27de5a-3504-4373-b72f-f1b4087044b9" providerId="ADAL" clId="{2BA1779F-04C8-E54A-8EF8-891D9A825069}" dt="2023-10-31T11:50:16.728" v="2291" actId="114"/>
           <ac:spMkLst>
             <pc:docMk/>
             <pc:sldMk cId="1661681403" sldId="342"/>
@@ -2685,8 +2685,8 @@
           </ac:spMkLst>
         </pc:spChg>
       </pc:sldChg>
-      <pc:sldChg chg="modSp new mod">
-        <pc:chgData name="Benjamin Rudski" userId="7f27de5a-3504-4373-b72f-f1b4087044b9" providerId="ADAL" clId="{2BA1779F-04C8-E54A-8EF8-891D9A825069}" dt="2023-10-30T15:34:16.350" v="2216" actId="20577"/>
+      <pc:sldChg chg="modSp new mod modAnim">
+        <pc:chgData name="Benjamin Rudski" userId="7f27de5a-3504-4373-b72f-f1b4087044b9" providerId="ADAL" clId="{2BA1779F-04C8-E54A-8EF8-891D9A825069}" dt="2023-10-31T11:51:27.404" v="2299"/>
         <pc:sldMkLst>
           <pc:docMk/>
           <pc:sldMk cId="3570743394" sldId="343"/>
@@ -10419,6 +10419,333 @@
       </p:transition>
     </mc:Fallback>
   </mc:AlternateContent>
+  <p:timing>
+    <p:tnLst>
+      <p:par>
+        <p:cTn id="1" dur="indefinite" restart="never" nodeType="tmRoot">
+          <p:childTnLst>
+            <p:seq concurrent="1" nextAc="seek">
+              <p:cTn id="2" dur="indefinite" nodeType="mainSeq">
+                <p:childTnLst>
+                  <p:par>
+                    <p:cTn id="3" fill="hold">
+                      <p:stCondLst>
+                        <p:cond delay="indefinite"/>
+                      </p:stCondLst>
+                      <p:childTnLst>
+                        <p:par>
+                          <p:cTn id="4" fill="hold">
+                            <p:stCondLst>
+                              <p:cond delay="0"/>
+                            </p:stCondLst>
+                            <p:childTnLst>
+                              <p:par>
+                                <p:cTn id="5" presetID="1" presetClass="entr" presetSubtype="0" fill="hold" grpId="0" nodeType="clickEffect">
+                                  <p:stCondLst>
+                                    <p:cond delay="0"/>
+                                  </p:stCondLst>
+                                  <p:childTnLst>
+                                    <p:set>
+                                      <p:cBhvr>
+                                        <p:cTn id="6" dur="1" fill="hold">
+                                          <p:stCondLst>
+                                            <p:cond delay="0"/>
+                                          </p:stCondLst>
+                                        </p:cTn>
+                                        <p:tgtEl>
+                                          <p:spTgt spid="3">
+                                            <p:txEl>
+                                              <p:pRg st="0" end="0"/>
+                                            </p:txEl>
+                                          </p:spTgt>
+                                        </p:tgtEl>
+                                        <p:attrNameLst>
+                                          <p:attrName>style.visibility</p:attrName>
+                                        </p:attrNameLst>
+                                      </p:cBhvr>
+                                      <p:to>
+                                        <p:strVal val="visible"/>
+                                      </p:to>
+                                    </p:set>
+                                  </p:childTnLst>
+                                </p:cTn>
+                              </p:par>
+                            </p:childTnLst>
+                          </p:cTn>
+                        </p:par>
+                      </p:childTnLst>
+                    </p:cTn>
+                  </p:par>
+                  <p:par>
+                    <p:cTn id="7" fill="hold">
+                      <p:stCondLst>
+                        <p:cond delay="indefinite"/>
+                      </p:stCondLst>
+                      <p:childTnLst>
+                        <p:par>
+                          <p:cTn id="8" fill="hold">
+                            <p:stCondLst>
+                              <p:cond delay="0"/>
+                            </p:stCondLst>
+                            <p:childTnLst>
+                              <p:par>
+                                <p:cTn id="9" presetID="1" presetClass="entr" presetSubtype="0" fill="hold" grpId="0" nodeType="clickEffect">
+                                  <p:stCondLst>
+                                    <p:cond delay="0"/>
+                                  </p:stCondLst>
+                                  <p:childTnLst>
+                                    <p:set>
+                                      <p:cBhvr>
+                                        <p:cTn id="10" dur="1" fill="hold">
+                                          <p:stCondLst>
+                                            <p:cond delay="0"/>
+                                          </p:stCondLst>
+                                        </p:cTn>
+                                        <p:tgtEl>
+                                          <p:spTgt spid="3">
+                                            <p:txEl>
+                                              <p:pRg st="1" end="1"/>
+                                            </p:txEl>
+                                          </p:spTgt>
+                                        </p:tgtEl>
+                                        <p:attrNameLst>
+                                          <p:attrName>style.visibility</p:attrName>
+                                        </p:attrNameLst>
+                                      </p:cBhvr>
+                                      <p:to>
+                                        <p:strVal val="visible"/>
+                                      </p:to>
+                                    </p:set>
+                                  </p:childTnLst>
+                                </p:cTn>
+                              </p:par>
+                            </p:childTnLst>
+                          </p:cTn>
+                        </p:par>
+                      </p:childTnLst>
+                    </p:cTn>
+                  </p:par>
+                  <p:par>
+                    <p:cTn id="11" fill="hold">
+                      <p:stCondLst>
+                        <p:cond delay="indefinite"/>
+                      </p:stCondLst>
+                      <p:childTnLst>
+                        <p:par>
+                          <p:cTn id="12" fill="hold">
+                            <p:stCondLst>
+                              <p:cond delay="0"/>
+                            </p:stCondLst>
+                            <p:childTnLst>
+                              <p:par>
+                                <p:cTn id="13" presetID="1" presetClass="entr" presetSubtype="0" fill="hold" grpId="0" nodeType="clickEffect">
+                                  <p:stCondLst>
+                                    <p:cond delay="0"/>
+                                  </p:stCondLst>
+                                  <p:childTnLst>
+                                    <p:set>
+                                      <p:cBhvr>
+                                        <p:cTn id="14" dur="1" fill="hold">
+                                          <p:stCondLst>
+                                            <p:cond delay="0"/>
+                                          </p:stCondLst>
+                                        </p:cTn>
+                                        <p:tgtEl>
+                                          <p:spTgt spid="3">
+                                            <p:txEl>
+                                              <p:pRg st="2" end="2"/>
+                                            </p:txEl>
+                                          </p:spTgt>
+                                        </p:tgtEl>
+                                        <p:attrNameLst>
+                                          <p:attrName>style.visibility</p:attrName>
+                                        </p:attrNameLst>
+                                      </p:cBhvr>
+                                      <p:to>
+                                        <p:strVal val="visible"/>
+                                      </p:to>
+                                    </p:set>
+                                  </p:childTnLst>
+                                </p:cTn>
+                              </p:par>
+                            </p:childTnLst>
+                          </p:cTn>
+                        </p:par>
+                      </p:childTnLst>
+                    </p:cTn>
+                  </p:par>
+                  <p:par>
+                    <p:cTn id="15" fill="hold">
+                      <p:stCondLst>
+                        <p:cond delay="indefinite"/>
+                      </p:stCondLst>
+                      <p:childTnLst>
+                        <p:par>
+                          <p:cTn id="16" fill="hold">
+                            <p:stCondLst>
+                              <p:cond delay="0"/>
+                            </p:stCondLst>
+                            <p:childTnLst>
+                              <p:par>
+                                <p:cTn id="17" presetID="1" presetClass="entr" presetSubtype="0" fill="hold" grpId="0" nodeType="clickEffect">
+                                  <p:stCondLst>
+                                    <p:cond delay="0"/>
+                                  </p:stCondLst>
+                                  <p:childTnLst>
+                                    <p:set>
+                                      <p:cBhvr>
+                                        <p:cTn id="18" dur="1" fill="hold">
+                                          <p:stCondLst>
+                                            <p:cond delay="0"/>
+                                          </p:stCondLst>
+                                        </p:cTn>
+                                        <p:tgtEl>
+                                          <p:spTgt spid="3">
+                                            <p:txEl>
+                                              <p:pRg st="3" end="3"/>
+                                            </p:txEl>
+                                          </p:spTgt>
+                                        </p:tgtEl>
+                                        <p:attrNameLst>
+                                          <p:attrName>style.visibility</p:attrName>
+                                        </p:attrNameLst>
+                                      </p:cBhvr>
+                                      <p:to>
+                                        <p:strVal val="visible"/>
+                                      </p:to>
+                                    </p:set>
+                                  </p:childTnLst>
+                                </p:cTn>
+                              </p:par>
+                            </p:childTnLst>
+                          </p:cTn>
+                        </p:par>
+                      </p:childTnLst>
+                    </p:cTn>
+                  </p:par>
+                  <p:par>
+                    <p:cTn id="19" fill="hold">
+                      <p:stCondLst>
+                        <p:cond delay="indefinite"/>
+                      </p:stCondLst>
+                      <p:childTnLst>
+                        <p:par>
+                          <p:cTn id="20" fill="hold">
+                            <p:stCondLst>
+                              <p:cond delay="0"/>
+                            </p:stCondLst>
+                            <p:childTnLst>
+                              <p:par>
+                                <p:cTn id="21" presetID="1" presetClass="entr" presetSubtype="0" fill="hold" grpId="0" nodeType="clickEffect">
+                                  <p:stCondLst>
+                                    <p:cond delay="0"/>
+                                  </p:stCondLst>
+                                  <p:childTnLst>
+                                    <p:set>
+                                      <p:cBhvr>
+                                        <p:cTn id="22" dur="1" fill="hold">
+                                          <p:stCondLst>
+                                            <p:cond delay="0"/>
+                                          </p:stCondLst>
+                                        </p:cTn>
+                                        <p:tgtEl>
+                                          <p:spTgt spid="3">
+                                            <p:txEl>
+                                              <p:pRg st="4" end="4"/>
+                                            </p:txEl>
+                                          </p:spTgt>
+                                        </p:tgtEl>
+                                        <p:attrNameLst>
+                                          <p:attrName>style.visibility</p:attrName>
+                                        </p:attrNameLst>
+                                      </p:cBhvr>
+                                      <p:to>
+                                        <p:strVal val="visible"/>
+                                      </p:to>
+                                    </p:set>
+                                  </p:childTnLst>
+                                </p:cTn>
+                              </p:par>
+                            </p:childTnLst>
+                          </p:cTn>
+                        </p:par>
+                      </p:childTnLst>
+                    </p:cTn>
+                  </p:par>
+                  <p:par>
+                    <p:cTn id="23" fill="hold">
+                      <p:stCondLst>
+                        <p:cond delay="indefinite"/>
+                      </p:stCondLst>
+                      <p:childTnLst>
+                        <p:par>
+                          <p:cTn id="24" fill="hold">
+                            <p:stCondLst>
+                              <p:cond delay="0"/>
+                            </p:stCondLst>
+                            <p:childTnLst>
+                              <p:par>
+                                <p:cTn id="25" presetID="1" presetClass="entr" presetSubtype="0" fill="hold" grpId="0" nodeType="clickEffect">
+                                  <p:stCondLst>
+                                    <p:cond delay="0"/>
+                                  </p:stCondLst>
+                                  <p:childTnLst>
+                                    <p:set>
+                                      <p:cBhvr>
+                                        <p:cTn id="26" dur="1" fill="hold">
+                                          <p:stCondLst>
+                                            <p:cond delay="0"/>
+                                          </p:stCondLst>
+                                        </p:cTn>
+                                        <p:tgtEl>
+                                          <p:spTgt spid="3">
+                                            <p:txEl>
+                                              <p:pRg st="5" end="5"/>
+                                            </p:txEl>
+                                          </p:spTgt>
+                                        </p:tgtEl>
+                                        <p:attrNameLst>
+                                          <p:attrName>style.visibility</p:attrName>
+                                        </p:attrNameLst>
+                                      </p:cBhvr>
+                                      <p:to>
+                                        <p:strVal val="visible"/>
+                                      </p:to>
+                                    </p:set>
+                                  </p:childTnLst>
+                                </p:cTn>
+                              </p:par>
+                            </p:childTnLst>
+                          </p:cTn>
+                        </p:par>
+                      </p:childTnLst>
+                    </p:cTn>
+                  </p:par>
+                </p:childTnLst>
+              </p:cTn>
+              <p:prevCondLst>
+                <p:cond evt="onPrev" delay="0">
+                  <p:tgtEl>
+                    <p:sldTgt/>
+                  </p:tgtEl>
+                </p:cond>
+              </p:prevCondLst>
+              <p:nextCondLst>
+                <p:cond evt="onNext" delay="0">
+                  <p:tgtEl>
+                    <p:sldTgt/>
+                  </p:tgtEl>
+                </p:cond>
+              </p:nextCondLst>
+            </p:seq>
+          </p:childTnLst>
+        </p:cTn>
+      </p:par>
+    </p:tnLst>
+    <p:bldLst>
+      <p:bldP spid="3" grpId="0" uiExpand="1" build="p"/>
+    </p:bldLst>
+  </p:timing>
 </p:sld>
 </file>
 
@@ -12218,6 +12545,658 @@
       </p:transition>
     </mc:Fallback>
   </mc:AlternateContent>
+  <p:timing>
+    <p:tnLst>
+      <p:par>
+        <p:cTn id="1" dur="indefinite" restart="never" nodeType="tmRoot">
+          <p:childTnLst>
+            <p:seq concurrent="1" nextAc="seek">
+              <p:cTn id="2" dur="indefinite" nodeType="mainSeq">
+                <p:childTnLst>
+                  <p:par>
+                    <p:cTn id="3" fill="hold">
+                      <p:stCondLst>
+                        <p:cond delay="indefinite"/>
+                      </p:stCondLst>
+                      <p:childTnLst>
+                        <p:par>
+                          <p:cTn id="4" fill="hold">
+                            <p:stCondLst>
+                              <p:cond delay="0"/>
+                            </p:stCondLst>
+                            <p:childTnLst>
+                              <p:par>
+                                <p:cTn id="5" presetID="23" presetClass="entr" presetSubtype="16" fill="hold" grpId="0" nodeType="clickEffect">
+                                  <p:stCondLst>
+                                    <p:cond delay="0"/>
+                                  </p:stCondLst>
+                                  <p:childTnLst>
+                                    <p:set>
+                                      <p:cBhvr>
+                                        <p:cTn id="6" dur="1" fill="hold">
+                                          <p:stCondLst>
+                                            <p:cond delay="0"/>
+                                          </p:stCondLst>
+                                        </p:cTn>
+                                        <p:tgtEl>
+                                          <p:spTgt spid="6">
+                                            <p:graphicEl>
+                                              <a:dgm id="{825B7F61-31D8-5E4A-8044-7E7573478E0E}"/>
+                                            </p:graphicEl>
+                                          </p:spTgt>
+                                        </p:tgtEl>
+                                        <p:attrNameLst>
+                                          <p:attrName>style.visibility</p:attrName>
+                                        </p:attrNameLst>
+                                      </p:cBhvr>
+                                      <p:to>
+                                        <p:strVal val="visible"/>
+                                      </p:to>
+                                    </p:set>
+                                    <p:anim calcmode="lin" valueType="num">
+                                      <p:cBhvr>
+                                        <p:cTn id="7" dur="500" fill="hold"/>
+                                        <p:tgtEl>
+                                          <p:spTgt spid="6">
+                                            <p:graphicEl>
+                                              <a:dgm id="{825B7F61-31D8-5E4A-8044-7E7573478E0E}"/>
+                                            </p:graphicEl>
+                                          </p:spTgt>
+                                        </p:tgtEl>
+                                        <p:attrNameLst>
+                                          <p:attrName>ppt_w</p:attrName>
+                                        </p:attrNameLst>
+                                      </p:cBhvr>
+                                      <p:tavLst>
+                                        <p:tav tm="0">
+                                          <p:val>
+                                            <p:fltVal val="0"/>
+                                          </p:val>
+                                        </p:tav>
+                                        <p:tav tm="100000">
+                                          <p:val>
+                                            <p:strVal val="#ppt_w"/>
+                                          </p:val>
+                                        </p:tav>
+                                      </p:tavLst>
+                                    </p:anim>
+                                    <p:anim calcmode="lin" valueType="num">
+                                      <p:cBhvr>
+                                        <p:cTn id="8" dur="500" fill="hold"/>
+                                        <p:tgtEl>
+                                          <p:spTgt spid="6">
+                                            <p:graphicEl>
+                                              <a:dgm id="{825B7F61-31D8-5E4A-8044-7E7573478E0E}"/>
+                                            </p:graphicEl>
+                                          </p:spTgt>
+                                        </p:tgtEl>
+                                        <p:attrNameLst>
+                                          <p:attrName>ppt_h</p:attrName>
+                                        </p:attrNameLst>
+                                      </p:cBhvr>
+                                      <p:tavLst>
+                                        <p:tav tm="0">
+                                          <p:val>
+                                            <p:fltVal val="0"/>
+                                          </p:val>
+                                        </p:tav>
+                                        <p:tav tm="100000">
+                                          <p:val>
+                                            <p:strVal val="#ppt_h"/>
+                                          </p:val>
+                                        </p:tav>
+                                      </p:tavLst>
+                                    </p:anim>
+                                  </p:childTnLst>
+                                </p:cTn>
+                              </p:par>
+                            </p:childTnLst>
+                          </p:cTn>
+                        </p:par>
+                      </p:childTnLst>
+                    </p:cTn>
+                  </p:par>
+                  <p:par>
+                    <p:cTn id="9" fill="hold">
+                      <p:stCondLst>
+                        <p:cond delay="indefinite"/>
+                      </p:stCondLst>
+                      <p:childTnLst>
+                        <p:par>
+                          <p:cTn id="10" fill="hold">
+                            <p:stCondLst>
+                              <p:cond delay="0"/>
+                            </p:stCondLst>
+                            <p:childTnLst>
+                              <p:par>
+                                <p:cTn id="11" presetID="23" presetClass="entr" presetSubtype="16" fill="hold" grpId="0" nodeType="clickEffect">
+                                  <p:stCondLst>
+                                    <p:cond delay="0"/>
+                                  </p:stCondLst>
+                                  <p:childTnLst>
+                                    <p:set>
+                                      <p:cBhvr>
+                                        <p:cTn id="12" dur="1" fill="hold">
+                                          <p:stCondLst>
+                                            <p:cond delay="0"/>
+                                          </p:stCondLst>
+                                        </p:cTn>
+                                        <p:tgtEl>
+                                          <p:spTgt spid="6">
+                                            <p:graphicEl>
+                                              <a:dgm id="{72AD8761-AE62-B445-87CA-018CEB7D759A}"/>
+                                            </p:graphicEl>
+                                          </p:spTgt>
+                                        </p:tgtEl>
+                                        <p:attrNameLst>
+                                          <p:attrName>style.visibility</p:attrName>
+                                        </p:attrNameLst>
+                                      </p:cBhvr>
+                                      <p:to>
+                                        <p:strVal val="visible"/>
+                                      </p:to>
+                                    </p:set>
+                                    <p:anim calcmode="lin" valueType="num">
+                                      <p:cBhvr>
+                                        <p:cTn id="13" dur="500" fill="hold"/>
+                                        <p:tgtEl>
+                                          <p:spTgt spid="6">
+                                            <p:graphicEl>
+                                              <a:dgm id="{72AD8761-AE62-B445-87CA-018CEB7D759A}"/>
+                                            </p:graphicEl>
+                                          </p:spTgt>
+                                        </p:tgtEl>
+                                        <p:attrNameLst>
+                                          <p:attrName>ppt_w</p:attrName>
+                                        </p:attrNameLst>
+                                      </p:cBhvr>
+                                      <p:tavLst>
+                                        <p:tav tm="0">
+                                          <p:val>
+                                            <p:fltVal val="0"/>
+                                          </p:val>
+                                        </p:tav>
+                                        <p:tav tm="100000">
+                                          <p:val>
+                                            <p:strVal val="#ppt_w"/>
+                                          </p:val>
+                                        </p:tav>
+                                      </p:tavLst>
+                                    </p:anim>
+                                    <p:anim calcmode="lin" valueType="num">
+                                      <p:cBhvr>
+                                        <p:cTn id="14" dur="500" fill="hold"/>
+                                        <p:tgtEl>
+                                          <p:spTgt spid="6">
+                                            <p:graphicEl>
+                                              <a:dgm id="{72AD8761-AE62-B445-87CA-018CEB7D759A}"/>
+                                            </p:graphicEl>
+                                          </p:spTgt>
+                                        </p:tgtEl>
+                                        <p:attrNameLst>
+                                          <p:attrName>ppt_h</p:attrName>
+                                        </p:attrNameLst>
+                                      </p:cBhvr>
+                                      <p:tavLst>
+                                        <p:tav tm="0">
+                                          <p:val>
+                                            <p:fltVal val="0"/>
+                                          </p:val>
+                                        </p:tav>
+                                        <p:tav tm="100000">
+                                          <p:val>
+                                            <p:strVal val="#ppt_h"/>
+                                          </p:val>
+                                        </p:tav>
+                                      </p:tavLst>
+                                    </p:anim>
+                                  </p:childTnLst>
+                                </p:cTn>
+                              </p:par>
+                              <p:par>
+                                <p:cTn id="15" presetID="23" presetClass="entr" presetSubtype="16" fill="hold" grpId="0" nodeType="withEffect">
+                                  <p:stCondLst>
+                                    <p:cond delay="0"/>
+                                  </p:stCondLst>
+                                  <p:childTnLst>
+                                    <p:set>
+                                      <p:cBhvr>
+                                        <p:cTn id="16" dur="1" fill="hold">
+                                          <p:stCondLst>
+                                            <p:cond delay="0"/>
+                                          </p:stCondLst>
+                                        </p:cTn>
+                                        <p:tgtEl>
+                                          <p:spTgt spid="6">
+                                            <p:graphicEl>
+                                              <a:dgm id="{0108C270-A821-FF4E-AB39-FA46ADC7D855}"/>
+                                            </p:graphicEl>
+                                          </p:spTgt>
+                                        </p:tgtEl>
+                                        <p:attrNameLst>
+                                          <p:attrName>style.visibility</p:attrName>
+                                        </p:attrNameLst>
+                                      </p:cBhvr>
+                                      <p:to>
+                                        <p:strVal val="visible"/>
+                                      </p:to>
+                                    </p:set>
+                                    <p:anim calcmode="lin" valueType="num">
+                                      <p:cBhvr>
+                                        <p:cTn id="17" dur="500" fill="hold"/>
+                                        <p:tgtEl>
+                                          <p:spTgt spid="6">
+                                            <p:graphicEl>
+                                              <a:dgm id="{0108C270-A821-FF4E-AB39-FA46ADC7D855}"/>
+                                            </p:graphicEl>
+                                          </p:spTgt>
+                                        </p:tgtEl>
+                                        <p:attrNameLst>
+                                          <p:attrName>ppt_w</p:attrName>
+                                        </p:attrNameLst>
+                                      </p:cBhvr>
+                                      <p:tavLst>
+                                        <p:tav tm="0">
+                                          <p:val>
+                                            <p:fltVal val="0"/>
+                                          </p:val>
+                                        </p:tav>
+                                        <p:tav tm="100000">
+                                          <p:val>
+                                            <p:strVal val="#ppt_w"/>
+                                          </p:val>
+                                        </p:tav>
+                                      </p:tavLst>
+                                    </p:anim>
+                                    <p:anim calcmode="lin" valueType="num">
+                                      <p:cBhvr>
+                                        <p:cTn id="18" dur="500" fill="hold"/>
+                                        <p:tgtEl>
+                                          <p:spTgt spid="6">
+                                            <p:graphicEl>
+                                              <a:dgm id="{0108C270-A821-FF4E-AB39-FA46ADC7D855}"/>
+                                            </p:graphicEl>
+                                          </p:spTgt>
+                                        </p:tgtEl>
+                                        <p:attrNameLst>
+                                          <p:attrName>ppt_h</p:attrName>
+                                        </p:attrNameLst>
+                                      </p:cBhvr>
+                                      <p:tavLst>
+                                        <p:tav tm="0">
+                                          <p:val>
+                                            <p:fltVal val="0"/>
+                                          </p:val>
+                                        </p:tav>
+                                        <p:tav tm="100000">
+                                          <p:val>
+                                            <p:strVal val="#ppt_h"/>
+                                          </p:val>
+                                        </p:tav>
+                                      </p:tavLst>
+                                    </p:anim>
+                                  </p:childTnLst>
+                                </p:cTn>
+                              </p:par>
+                            </p:childTnLst>
+                          </p:cTn>
+                        </p:par>
+                      </p:childTnLst>
+                    </p:cTn>
+                  </p:par>
+                  <p:par>
+                    <p:cTn id="19" fill="hold">
+                      <p:stCondLst>
+                        <p:cond delay="indefinite"/>
+                      </p:stCondLst>
+                      <p:childTnLst>
+                        <p:par>
+                          <p:cTn id="20" fill="hold">
+                            <p:stCondLst>
+                              <p:cond delay="0"/>
+                            </p:stCondLst>
+                            <p:childTnLst>
+                              <p:par>
+                                <p:cTn id="21" presetID="23" presetClass="entr" presetSubtype="16" fill="hold" grpId="0" nodeType="clickEffect">
+                                  <p:stCondLst>
+                                    <p:cond delay="0"/>
+                                  </p:stCondLst>
+                                  <p:childTnLst>
+                                    <p:set>
+                                      <p:cBhvr>
+                                        <p:cTn id="22" dur="1" fill="hold">
+                                          <p:stCondLst>
+                                            <p:cond delay="0"/>
+                                          </p:stCondLst>
+                                        </p:cTn>
+                                        <p:tgtEl>
+                                          <p:spTgt spid="6">
+                                            <p:graphicEl>
+                                              <a:dgm id="{C9C02B99-85EF-7A41-8772-C24A42938477}"/>
+                                            </p:graphicEl>
+                                          </p:spTgt>
+                                        </p:tgtEl>
+                                        <p:attrNameLst>
+                                          <p:attrName>style.visibility</p:attrName>
+                                        </p:attrNameLst>
+                                      </p:cBhvr>
+                                      <p:to>
+                                        <p:strVal val="visible"/>
+                                      </p:to>
+                                    </p:set>
+                                    <p:anim calcmode="lin" valueType="num">
+                                      <p:cBhvr>
+                                        <p:cTn id="23" dur="500" fill="hold"/>
+                                        <p:tgtEl>
+                                          <p:spTgt spid="6">
+                                            <p:graphicEl>
+                                              <a:dgm id="{C9C02B99-85EF-7A41-8772-C24A42938477}"/>
+                                            </p:graphicEl>
+                                          </p:spTgt>
+                                        </p:tgtEl>
+                                        <p:attrNameLst>
+                                          <p:attrName>ppt_w</p:attrName>
+                                        </p:attrNameLst>
+                                      </p:cBhvr>
+                                      <p:tavLst>
+                                        <p:tav tm="0">
+                                          <p:val>
+                                            <p:fltVal val="0"/>
+                                          </p:val>
+                                        </p:tav>
+                                        <p:tav tm="100000">
+                                          <p:val>
+                                            <p:strVal val="#ppt_w"/>
+                                          </p:val>
+                                        </p:tav>
+                                      </p:tavLst>
+                                    </p:anim>
+                                    <p:anim calcmode="lin" valueType="num">
+                                      <p:cBhvr>
+                                        <p:cTn id="24" dur="500" fill="hold"/>
+                                        <p:tgtEl>
+                                          <p:spTgt spid="6">
+                                            <p:graphicEl>
+                                              <a:dgm id="{C9C02B99-85EF-7A41-8772-C24A42938477}"/>
+                                            </p:graphicEl>
+                                          </p:spTgt>
+                                        </p:tgtEl>
+                                        <p:attrNameLst>
+                                          <p:attrName>ppt_h</p:attrName>
+                                        </p:attrNameLst>
+                                      </p:cBhvr>
+                                      <p:tavLst>
+                                        <p:tav tm="0">
+                                          <p:val>
+                                            <p:fltVal val="0"/>
+                                          </p:val>
+                                        </p:tav>
+                                        <p:tav tm="100000">
+                                          <p:val>
+                                            <p:strVal val="#ppt_h"/>
+                                          </p:val>
+                                        </p:tav>
+                                      </p:tavLst>
+                                    </p:anim>
+                                  </p:childTnLst>
+                                </p:cTn>
+                              </p:par>
+                              <p:par>
+                                <p:cTn id="25" presetID="23" presetClass="entr" presetSubtype="16" fill="hold" grpId="0" nodeType="withEffect">
+                                  <p:stCondLst>
+                                    <p:cond delay="0"/>
+                                  </p:stCondLst>
+                                  <p:childTnLst>
+                                    <p:set>
+                                      <p:cBhvr>
+                                        <p:cTn id="26" dur="1" fill="hold">
+                                          <p:stCondLst>
+                                            <p:cond delay="0"/>
+                                          </p:stCondLst>
+                                        </p:cTn>
+                                        <p:tgtEl>
+                                          <p:spTgt spid="6">
+                                            <p:graphicEl>
+                                              <a:dgm id="{B3AB4F9B-4D53-7742-BD3E-EEB8AFCD8805}"/>
+                                            </p:graphicEl>
+                                          </p:spTgt>
+                                        </p:tgtEl>
+                                        <p:attrNameLst>
+                                          <p:attrName>style.visibility</p:attrName>
+                                        </p:attrNameLst>
+                                      </p:cBhvr>
+                                      <p:to>
+                                        <p:strVal val="visible"/>
+                                      </p:to>
+                                    </p:set>
+                                    <p:anim calcmode="lin" valueType="num">
+                                      <p:cBhvr>
+                                        <p:cTn id="27" dur="500" fill="hold"/>
+                                        <p:tgtEl>
+                                          <p:spTgt spid="6">
+                                            <p:graphicEl>
+                                              <a:dgm id="{B3AB4F9B-4D53-7742-BD3E-EEB8AFCD8805}"/>
+                                            </p:graphicEl>
+                                          </p:spTgt>
+                                        </p:tgtEl>
+                                        <p:attrNameLst>
+                                          <p:attrName>ppt_w</p:attrName>
+                                        </p:attrNameLst>
+                                      </p:cBhvr>
+                                      <p:tavLst>
+                                        <p:tav tm="0">
+                                          <p:val>
+                                            <p:fltVal val="0"/>
+                                          </p:val>
+                                        </p:tav>
+                                        <p:tav tm="100000">
+                                          <p:val>
+                                            <p:strVal val="#ppt_w"/>
+                                          </p:val>
+                                        </p:tav>
+                                      </p:tavLst>
+                                    </p:anim>
+                                    <p:anim calcmode="lin" valueType="num">
+                                      <p:cBhvr>
+                                        <p:cTn id="28" dur="500" fill="hold"/>
+                                        <p:tgtEl>
+                                          <p:spTgt spid="6">
+                                            <p:graphicEl>
+                                              <a:dgm id="{B3AB4F9B-4D53-7742-BD3E-EEB8AFCD8805}"/>
+                                            </p:graphicEl>
+                                          </p:spTgt>
+                                        </p:tgtEl>
+                                        <p:attrNameLst>
+                                          <p:attrName>ppt_h</p:attrName>
+                                        </p:attrNameLst>
+                                      </p:cBhvr>
+                                      <p:tavLst>
+                                        <p:tav tm="0">
+                                          <p:val>
+                                            <p:fltVal val="0"/>
+                                          </p:val>
+                                        </p:tav>
+                                        <p:tav tm="100000">
+                                          <p:val>
+                                            <p:strVal val="#ppt_h"/>
+                                          </p:val>
+                                        </p:tav>
+                                      </p:tavLst>
+                                    </p:anim>
+                                  </p:childTnLst>
+                                </p:cTn>
+                              </p:par>
+                            </p:childTnLst>
+                          </p:cTn>
+                        </p:par>
+                      </p:childTnLst>
+                    </p:cTn>
+                  </p:par>
+                  <p:par>
+                    <p:cTn id="29" fill="hold">
+                      <p:stCondLst>
+                        <p:cond delay="indefinite"/>
+                      </p:stCondLst>
+                      <p:childTnLst>
+                        <p:par>
+                          <p:cTn id="30" fill="hold">
+                            <p:stCondLst>
+                              <p:cond delay="0"/>
+                            </p:stCondLst>
+                            <p:childTnLst>
+                              <p:par>
+                                <p:cTn id="31" presetID="22" presetClass="entr" presetSubtype="8" fill="hold" grpId="0" nodeType="clickEffect">
+                                  <p:stCondLst>
+                                    <p:cond delay="0"/>
+                                  </p:stCondLst>
+                                  <p:childTnLst>
+                                    <p:set>
+                                      <p:cBhvr>
+                                        <p:cTn id="32" dur="1" fill="hold">
+                                          <p:stCondLst>
+                                            <p:cond delay="0"/>
+                                          </p:stCondLst>
+                                        </p:cTn>
+                                        <p:tgtEl>
+                                          <p:spTgt spid="9"/>
+                                        </p:tgtEl>
+                                        <p:attrNameLst>
+                                          <p:attrName>style.visibility</p:attrName>
+                                        </p:attrNameLst>
+                                      </p:cBhvr>
+                                      <p:to>
+                                        <p:strVal val="visible"/>
+                                      </p:to>
+                                    </p:set>
+                                    <p:animEffect transition="in" filter="wipe(left)">
+                                      <p:cBhvr>
+                                        <p:cTn id="33" dur="500"/>
+                                        <p:tgtEl>
+                                          <p:spTgt spid="9"/>
+                                        </p:tgtEl>
+                                      </p:cBhvr>
+                                    </p:animEffect>
+                                  </p:childTnLst>
+                                </p:cTn>
+                              </p:par>
+                              <p:par>
+                                <p:cTn id="34" presetID="22" presetClass="entr" presetSubtype="8" fill="hold" grpId="0" nodeType="withEffect">
+                                  <p:stCondLst>
+                                    <p:cond delay="0"/>
+                                  </p:stCondLst>
+                                  <p:childTnLst>
+                                    <p:set>
+                                      <p:cBhvr>
+                                        <p:cTn id="35" dur="1" fill="hold">
+                                          <p:stCondLst>
+                                            <p:cond delay="0"/>
+                                          </p:stCondLst>
+                                        </p:cTn>
+                                        <p:tgtEl>
+                                          <p:spTgt spid="13"/>
+                                        </p:tgtEl>
+                                        <p:attrNameLst>
+                                          <p:attrName>style.visibility</p:attrName>
+                                        </p:attrNameLst>
+                                      </p:cBhvr>
+                                      <p:to>
+                                        <p:strVal val="visible"/>
+                                      </p:to>
+                                    </p:set>
+                                    <p:animEffect transition="in" filter="wipe(left)">
+                                      <p:cBhvr>
+                                        <p:cTn id="36" dur="500"/>
+                                        <p:tgtEl>
+                                          <p:spTgt spid="13"/>
+                                        </p:tgtEl>
+                                      </p:cBhvr>
+                                    </p:animEffect>
+                                  </p:childTnLst>
+                                </p:cTn>
+                              </p:par>
+                            </p:childTnLst>
+                          </p:cTn>
+                        </p:par>
+                      </p:childTnLst>
+                    </p:cTn>
+                  </p:par>
+                  <p:par>
+                    <p:cTn id="37" fill="hold">
+                      <p:stCondLst>
+                        <p:cond delay="indefinite"/>
+                      </p:stCondLst>
+                      <p:childTnLst>
+                        <p:par>
+                          <p:cTn id="38" fill="hold">
+                            <p:stCondLst>
+                              <p:cond delay="0"/>
+                            </p:stCondLst>
+                            <p:childTnLst>
+                              <p:par>
+                                <p:cTn id="39" presetID="1" presetClass="entr" presetSubtype="0" fill="hold" grpId="0" nodeType="clickEffect">
+                                  <p:stCondLst>
+                                    <p:cond delay="0"/>
+                                  </p:stCondLst>
+                                  <p:childTnLst>
+                                    <p:set>
+                                      <p:cBhvr>
+                                        <p:cTn id="40" dur="1" fill="hold">
+                                          <p:stCondLst>
+                                            <p:cond delay="0"/>
+                                          </p:stCondLst>
+                                        </p:cTn>
+                                        <p:tgtEl>
+                                          <p:spTgt spid="3"/>
+                                        </p:tgtEl>
+                                        <p:attrNameLst>
+                                          <p:attrName>style.visibility</p:attrName>
+                                        </p:attrNameLst>
+                                      </p:cBhvr>
+                                      <p:to>
+                                        <p:strVal val="visible"/>
+                                      </p:to>
+                                    </p:set>
+                                  </p:childTnLst>
+                                </p:cTn>
+                              </p:par>
+                            </p:childTnLst>
+                          </p:cTn>
+                        </p:par>
+                      </p:childTnLst>
+                    </p:cTn>
+                  </p:par>
+                </p:childTnLst>
+              </p:cTn>
+              <p:prevCondLst>
+                <p:cond evt="onPrev" delay="0">
+                  <p:tgtEl>
+                    <p:sldTgt/>
+                  </p:tgtEl>
+                </p:cond>
+              </p:prevCondLst>
+              <p:nextCondLst>
+                <p:cond evt="onNext" delay="0">
+                  <p:tgtEl>
+                    <p:sldTgt/>
+                  </p:tgtEl>
+                </p:cond>
+              </p:nextCondLst>
+            </p:seq>
+          </p:childTnLst>
+        </p:cTn>
+      </p:par>
+    </p:tnLst>
+    <p:bldLst>
+      <p:bldGraphic spid="6" grpId="0">
+        <p:bldSub>
+          <a:bldDgm bld="one"/>
+        </p:bldSub>
+      </p:bldGraphic>
+      <p:bldP spid="9" grpId="0"/>
+      <p:bldP spid="13" grpId="0" animBg="1"/>
+      <p:bldP spid="3" grpId="0"/>
+    </p:bldLst>
+  </p:timing>
 </p:sld>
 </file>
 
@@ -12414,6 +13393,284 @@
       </p:transition>
     </mc:Fallback>
   </mc:AlternateContent>
+  <p:timing>
+    <p:tnLst>
+      <p:par>
+        <p:cTn id="1" dur="indefinite" restart="never" nodeType="tmRoot">
+          <p:childTnLst>
+            <p:seq concurrent="1" nextAc="seek">
+              <p:cTn id="2" dur="indefinite" nodeType="mainSeq">
+                <p:childTnLst>
+                  <p:par>
+                    <p:cTn id="3" fill="hold">
+                      <p:stCondLst>
+                        <p:cond delay="indefinite"/>
+                      </p:stCondLst>
+                      <p:childTnLst>
+                        <p:par>
+                          <p:cTn id="4" fill="hold">
+                            <p:stCondLst>
+                              <p:cond delay="0"/>
+                            </p:stCondLst>
+                            <p:childTnLst>
+                              <p:par>
+                                <p:cTn id="5" presetID="1" presetClass="entr" presetSubtype="0" fill="hold" grpId="0" nodeType="clickEffect">
+                                  <p:stCondLst>
+                                    <p:cond delay="0"/>
+                                  </p:stCondLst>
+                                  <p:childTnLst>
+                                    <p:set>
+                                      <p:cBhvr>
+                                        <p:cTn id="6" dur="1" fill="hold">
+                                          <p:stCondLst>
+                                            <p:cond delay="0"/>
+                                          </p:stCondLst>
+                                        </p:cTn>
+                                        <p:tgtEl>
+                                          <p:spTgt spid="3">
+                                            <p:txEl>
+                                              <p:pRg st="0" end="0"/>
+                                            </p:txEl>
+                                          </p:spTgt>
+                                        </p:tgtEl>
+                                        <p:attrNameLst>
+                                          <p:attrName>style.visibility</p:attrName>
+                                        </p:attrNameLst>
+                                      </p:cBhvr>
+                                      <p:to>
+                                        <p:strVal val="visible"/>
+                                      </p:to>
+                                    </p:set>
+                                  </p:childTnLst>
+                                </p:cTn>
+                              </p:par>
+                            </p:childTnLst>
+                          </p:cTn>
+                        </p:par>
+                      </p:childTnLst>
+                    </p:cTn>
+                  </p:par>
+                  <p:par>
+                    <p:cTn id="7" fill="hold">
+                      <p:stCondLst>
+                        <p:cond delay="indefinite"/>
+                      </p:stCondLst>
+                      <p:childTnLst>
+                        <p:par>
+                          <p:cTn id="8" fill="hold">
+                            <p:stCondLst>
+                              <p:cond delay="0"/>
+                            </p:stCondLst>
+                            <p:childTnLst>
+                              <p:par>
+                                <p:cTn id="9" presetID="1" presetClass="entr" presetSubtype="0" fill="hold" grpId="0" nodeType="clickEffect">
+                                  <p:stCondLst>
+                                    <p:cond delay="0"/>
+                                  </p:stCondLst>
+                                  <p:childTnLst>
+                                    <p:set>
+                                      <p:cBhvr>
+                                        <p:cTn id="10" dur="1" fill="hold">
+                                          <p:stCondLst>
+                                            <p:cond delay="0"/>
+                                          </p:stCondLst>
+                                        </p:cTn>
+                                        <p:tgtEl>
+                                          <p:spTgt spid="3">
+                                            <p:txEl>
+                                              <p:pRg st="1" end="1"/>
+                                            </p:txEl>
+                                          </p:spTgt>
+                                        </p:tgtEl>
+                                        <p:attrNameLst>
+                                          <p:attrName>style.visibility</p:attrName>
+                                        </p:attrNameLst>
+                                      </p:cBhvr>
+                                      <p:to>
+                                        <p:strVal val="visible"/>
+                                      </p:to>
+                                    </p:set>
+                                  </p:childTnLst>
+                                </p:cTn>
+                              </p:par>
+                            </p:childTnLst>
+                          </p:cTn>
+                        </p:par>
+                      </p:childTnLst>
+                    </p:cTn>
+                  </p:par>
+                  <p:par>
+                    <p:cTn id="11" fill="hold">
+                      <p:stCondLst>
+                        <p:cond delay="indefinite"/>
+                      </p:stCondLst>
+                      <p:childTnLst>
+                        <p:par>
+                          <p:cTn id="12" fill="hold">
+                            <p:stCondLst>
+                              <p:cond delay="0"/>
+                            </p:stCondLst>
+                            <p:childTnLst>
+                              <p:par>
+                                <p:cTn id="13" presetID="1" presetClass="entr" presetSubtype="0" fill="hold" grpId="0" nodeType="clickEffect">
+                                  <p:stCondLst>
+                                    <p:cond delay="0"/>
+                                  </p:stCondLst>
+                                  <p:childTnLst>
+                                    <p:set>
+                                      <p:cBhvr>
+                                        <p:cTn id="14" dur="1" fill="hold">
+                                          <p:stCondLst>
+                                            <p:cond delay="0"/>
+                                          </p:stCondLst>
+                                        </p:cTn>
+                                        <p:tgtEl>
+                                          <p:spTgt spid="3">
+                                            <p:txEl>
+                                              <p:pRg st="2" end="2"/>
+                                            </p:txEl>
+                                          </p:spTgt>
+                                        </p:tgtEl>
+                                        <p:attrNameLst>
+                                          <p:attrName>style.visibility</p:attrName>
+                                        </p:attrNameLst>
+                                      </p:cBhvr>
+                                      <p:to>
+                                        <p:strVal val="visible"/>
+                                      </p:to>
+                                    </p:set>
+                                  </p:childTnLst>
+                                </p:cTn>
+                              </p:par>
+                            </p:childTnLst>
+                          </p:cTn>
+                        </p:par>
+                      </p:childTnLst>
+                    </p:cTn>
+                  </p:par>
+                  <p:par>
+                    <p:cTn id="15" fill="hold">
+                      <p:stCondLst>
+                        <p:cond delay="indefinite"/>
+                      </p:stCondLst>
+                      <p:childTnLst>
+                        <p:par>
+                          <p:cTn id="16" fill="hold">
+                            <p:stCondLst>
+                              <p:cond delay="0"/>
+                            </p:stCondLst>
+                            <p:childTnLst>
+                              <p:par>
+                                <p:cTn id="17" presetID="1" presetClass="entr" presetSubtype="0" fill="hold" grpId="0" nodeType="clickEffect">
+                                  <p:stCondLst>
+                                    <p:cond delay="0"/>
+                                  </p:stCondLst>
+                                  <p:childTnLst>
+                                    <p:set>
+                                      <p:cBhvr>
+                                        <p:cTn id="18" dur="1" fill="hold">
+                                          <p:stCondLst>
+                                            <p:cond delay="0"/>
+                                          </p:stCondLst>
+                                        </p:cTn>
+                                        <p:tgtEl>
+                                          <p:spTgt spid="3">
+                                            <p:txEl>
+                                              <p:pRg st="3" end="3"/>
+                                            </p:txEl>
+                                          </p:spTgt>
+                                        </p:tgtEl>
+                                        <p:attrNameLst>
+                                          <p:attrName>style.visibility</p:attrName>
+                                        </p:attrNameLst>
+                                      </p:cBhvr>
+                                      <p:to>
+                                        <p:strVal val="visible"/>
+                                      </p:to>
+                                    </p:set>
+                                  </p:childTnLst>
+                                </p:cTn>
+                              </p:par>
+                            </p:childTnLst>
+                          </p:cTn>
+                        </p:par>
+                      </p:childTnLst>
+                    </p:cTn>
+                  </p:par>
+                  <p:par>
+                    <p:cTn id="19" fill="hold">
+                      <p:stCondLst>
+                        <p:cond delay="indefinite"/>
+                      </p:stCondLst>
+                      <p:childTnLst>
+                        <p:par>
+                          <p:cTn id="20" fill="hold">
+                            <p:stCondLst>
+                              <p:cond delay="0"/>
+                            </p:stCondLst>
+                            <p:childTnLst>
+                              <p:par>
+                                <p:cTn id="21" presetID="1" presetClass="entr" presetSubtype="0" fill="hold" grpId="0" nodeType="clickEffect">
+                                  <p:stCondLst>
+                                    <p:cond delay="0"/>
+                                  </p:stCondLst>
+                                  <p:childTnLst>
+                                    <p:set>
+                                      <p:cBhvr>
+                                        <p:cTn id="22" dur="1" fill="hold">
+                                          <p:stCondLst>
+                                            <p:cond delay="0"/>
+                                          </p:stCondLst>
+                                        </p:cTn>
+                                        <p:tgtEl>
+                                          <p:spTgt spid="3">
+                                            <p:txEl>
+                                              <p:pRg st="4" end="4"/>
+                                            </p:txEl>
+                                          </p:spTgt>
+                                        </p:tgtEl>
+                                        <p:attrNameLst>
+                                          <p:attrName>style.visibility</p:attrName>
+                                        </p:attrNameLst>
+                                      </p:cBhvr>
+                                      <p:to>
+                                        <p:strVal val="visible"/>
+                                      </p:to>
+                                    </p:set>
+                                  </p:childTnLst>
+                                </p:cTn>
+                              </p:par>
+                            </p:childTnLst>
+                          </p:cTn>
+                        </p:par>
+                      </p:childTnLst>
+                    </p:cTn>
+                  </p:par>
+                </p:childTnLst>
+              </p:cTn>
+              <p:prevCondLst>
+                <p:cond evt="onPrev" delay="0">
+                  <p:tgtEl>
+                    <p:sldTgt/>
+                  </p:tgtEl>
+                </p:cond>
+              </p:prevCondLst>
+              <p:nextCondLst>
+                <p:cond evt="onNext" delay="0">
+                  <p:tgtEl>
+                    <p:sldTgt/>
+                  </p:tgtEl>
+                </p:cond>
+              </p:nextCondLst>
+            </p:seq>
+          </p:childTnLst>
+        </p:cTn>
+      </p:par>
+    </p:tnLst>
+    <p:bldLst>
+      <p:bldP spid="3" grpId="0" uiExpand="1" build="p"/>
+    </p:bldLst>
+  </p:timing>
 </p:sld>
 </file>
 
@@ -12480,7 +13737,9 @@
         </p:nvSpPr>
         <p:spPr/>
         <p:txBody>
-          <a:bodyPr/>
+          <a:bodyPr>
+            <a:normAutofit/>
+          </a:bodyPr>
           <a:lstStyle/>
           <a:p>
             <a:r>
@@ -12541,6 +13800,21 @@
             <a:r>
               <a:rPr lang="en-CA" dirty="0"/>
               <a:t>Easy to run and to modify arguments.</a:t>
+            </a:r>
+          </a:p>
+          <a:p>
+            <a:pPr lvl="1"/>
+            <a:r>
+              <a:rPr lang="en-CA" dirty="0"/>
+              <a:t>Runs </a:t>
+            </a:r>
+            <a:r>
+              <a:rPr lang="en-CA" b="1" i="1" dirty="0"/>
+              <a:t>automatically</a:t>
+            </a:r>
+            <a:r>
+              <a:rPr lang="en-CA" dirty="0"/>
+              <a:t> (locally or on a cluster, like DRAC)</a:t>
             </a:r>
           </a:p>
         </p:txBody>
@@ -12625,6 +13899,480 @@
       </p:transition>
     </mc:Fallback>
   </mc:AlternateContent>
+  <p:timing>
+    <p:tnLst>
+      <p:par>
+        <p:cTn id="1" dur="indefinite" restart="never" nodeType="tmRoot">
+          <p:childTnLst>
+            <p:seq concurrent="1" nextAc="seek">
+              <p:cTn id="2" dur="indefinite" nodeType="mainSeq">
+                <p:childTnLst>
+                  <p:par>
+                    <p:cTn id="3" fill="hold">
+                      <p:stCondLst>
+                        <p:cond delay="indefinite"/>
+                      </p:stCondLst>
+                      <p:childTnLst>
+                        <p:par>
+                          <p:cTn id="4" fill="hold">
+                            <p:stCondLst>
+                              <p:cond delay="0"/>
+                            </p:stCondLst>
+                            <p:childTnLst>
+                              <p:par>
+                                <p:cTn id="5" presetID="1" presetClass="entr" presetSubtype="0" fill="hold" grpId="0" nodeType="clickEffect">
+                                  <p:stCondLst>
+                                    <p:cond delay="0"/>
+                                  </p:stCondLst>
+                                  <p:childTnLst>
+                                    <p:set>
+                                      <p:cBhvr>
+                                        <p:cTn id="6" dur="1" fill="hold">
+                                          <p:stCondLst>
+                                            <p:cond delay="0"/>
+                                          </p:stCondLst>
+                                        </p:cTn>
+                                        <p:tgtEl>
+                                          <p:spTgt spid="3">
+                                            <p:txEl>
+                                              <p:pRg st="0" end="0"/>
+                                            </p:txEl>
+                                          </p:spTgt>
+                                        </p:tgtEl>
+                                        <p:attrNameLst>
+                                          <p:attrName>style.visibility</p:attrName>
+                                        </p:attrNameLst>
+                                      </p:cBhvr>
+                                      <p:to>
+                                        <p:strVal val="visible"/>
+                                      </p:to>
+                                    </p:set>
+                                  </p:childTnLst>
+                                </p:cTn>
+                              </p:par>
+                            </p:childTnLst>
+                          </p:cTn>
+                        </p:par>
+                      </p:childTnLst>
+                    </p:cTn>
+                  </p:par>
+                  <p:par>
+                    <p:cTn id="7" fill="hold">
+                      <p:stCondLst>
+                        <p:cond delay="indefinite"/>
+                      </p:stCondLst>
+                      <p:childTnLst>
+                        <p:par>
+                          <p:cTn id="8" fill="hold">
+                            <p:stCondLst>
+                              <p:cond delay="0"/>
+                            </p:stCondLst>
+                            <p:childTnLst>
+                              <p:par>
+                                <p:cTn id="9" presetID="1" presetClass="entr" presetSubtype="0" fill="hold" grpId="0" nodeType="clickEffect">
+                                  <p:stCondLst>
+                                    <p:cond delay="0"/>
+                                  </p:stCondLst>
+                                  <p:childTnLst>
+                                    <p:set>
+                                      <p:cBhvr>
+                                        <p:cTn id="10" dur="1" fill="hold">
+                                          <p:stCondLst>
+                                            <p:cond delay="0"/>
+                                          </p:stCondLst>
+                                        </p:cTn>
+                                        <p:tgtEl>
+                                          <p:spTgt spid="3">
+                                            <p:txEl>
+                                              <p:pRg st="1" end="1"/>
+                                            </p:txEl>
+                                          </p:spTgt>
+                                        </p:tgtEl>
+                                        <p:attrNameLst>
+                                          <p:attrName>style.visibility</p:attrName>
+                                        </p:attrNameLst>
+                                      </p:cBhvr>
+                                      <p:to>
+                                        <p:strVal val="visible"/>
+                                      </p:to>
+                                    </p:set>
+                                  </p:childTnLst>
+                                </p:cTn>
+                              </p:par>
+                            </p:childTnLst>
+                          </p:cTn>
+                        </p:par>
+                      </p:childTnLst>
+                    </p:cTn>
+                  </p:par>
+                  <p:par>
+                    <p:cTn id="11" fill="hold">
+                      <p:stCondLst>
+                        <p:cond delay="indefinite"/>
+                      </p:stCondLst>
+                      <p:childTnLst>
+                        <p:par>
+                          <p:cTn id="12" fill="hold">
+                            <p:stCondLst>
+                              <p:cond delay="0"/>
+                            </p:stCondLst>
+                            <p:childTnLst>
+                              <p:par>
+                                <p:cTn id="13" presetID="1" presetClass="entr" presetSubtype="0" fill="hold" grpId="0" nodeType="clickEffect">
+                                  <p:stCondLst>
+                                    <p:cond delay="0"/>
+                                  </p:stCondLst>
+                                  <p:childTnLst>
+                                    <p:set>
+                                      <p:cBhvr>
+                                        <p:cTn id="14" dur="1" fill="hold">
+                                          <p:stCondLst>
+                                            <p:cond delay="0"/>
+                                          </p:stCondLst>
+                                        </p:cTn>
+                                        <p:tgtEl>
+                                          <p:spTgt spid="3">
+                                            <p:txEl>
+                                              <p:pRg st="2" end="2"/>
+                                            </p:txEl>
+                                          </p:spTgt>
+                                        </p:tgtEl>
+                                        <p:attrNameLst>
+                                          <p:attrName>style.visibility</p:attrName>
+                                        </p:attrNameLst>
+                                      </p:cBhvr>
+                                      <p:to>
+                                        <p:strVal val="visible"/>
+                                      </p:to>
+                                    </p:set>
+                                  </p:childTnLst>
+                                </p:cTn>
+                              </p:par>
+                            </p:childTnLst>
+                          </p:cTn>
+                        </p:par>
+                      </p:childTnLst>
+                    </p:cTn>
+                  </p:par>
+                  <p:par>
+                    <p:cTn id="15" fill="hold">
+                      <p:stCondLst>
+                        <p:cond delay="indefinite"/>
+                      </p:stCondLst>
+                      <p:childTnLst>
+                        <p:par>
+                          <p:cTn id="16" fill="hold">
+                            <p:stCondLst>
+                              <p:cond delay="0"/>
+                            </p:stCondLst>
+                            <p:childTnLst>
+                              <p:par>
+                                <p:cTn id="17" presetID="1" presetClass="entr" presetSubtype="0" fill="hold" grpId="0" nodeType="clickEffect">
+                                  <p:stCondLst>
+                                    <p:cond delay="0"/>
+                                  </p:stCondLst>
+                                  <p:childTnLst>
+                                    <p:set>
+                                      <p:cBhvr>
+                                        <p:cTn id="18" dur="1" fill="hold">
+                                          <p:stCondLst>
+                                            <p:cond delay="0"/>
+                                          </p:stCondLst>
+                                        </p:cTn>
+                                        <p:tgtEl>
+                                          <p:spTgt spid="3">
+                                            <p:txEl>
+                                              <p:pRg st="3" end="3"/>
+                                            </p:txEl>
+                                          </p:spTgt>
+                                        </p:tgtEl>
+                                        <p:attrNameLst>
+                                          <p:attrName>style.visibility</p:attrName>
+                                        </p:attrNameLst>
+                                      </p:cBhvr>
+                                      <p:to>
+                                        <p:strVal val="visible"/>
+                                      </p:to>
+                                    </p:set>
+                                  </p:childTnLst>
+                                </p:cTn>
+                              </p:par>
+                            </p:childTnLst>
+                          </p:cTn>
+                        </p:par>
+                      </p:childTnLst>
+                    </p:cTn>
+                  </p:par>
+                  <p:par>
+                    <p:cTn id="19" fill="hold">
+                      <p:stCondLst>
+                        <p:cond delay="indefinite"/>
+                      </p:stCondLst>
+                      <p:childTnLst>
+                        <p:par>
+                          <p:cTn id="20" fill="hold">
+                            <p:stCondLst>
+                              <p:cond delay="0"/>
+                            </p:stCondLst>
+                            <p:childTnLst>
+                              <p:par>
+                                <p:cTn id="21" presetID="1" presetClass="entr" presetSubtype="0" fill="hold" grpId="0" nodeType="clickEffect">
+                                  <p:stCondLst>
+                                    <p:cond delay="0"/>
+                                  </p:stCondLst>
+                                  <p:childTnLst>
+                                    <p:set>
+                                      <p:cBhvr>
+                                        <p:cTn id="22" dur="1" fill="hold">
+                                          <p:stCondLst>
+                                            <p:cond delay="0"/>
+                                          </p:stCondLst>
+                                        </p:cTn>
+                                        <p:tgtEl>
+                                          <p:spTgt spid="3">
+                                            <p:txEl>
+                                              <p:pRg st="4" end="4"/>
+                                            </p:txEl>
+                                          </p:spTgt>
+                                        </p:tgtEl>
+                                        <p:attrNameLst>
+                                          <p:attrName>style.visibility</p:attrName>
+                                        </p:attrNameLst>
+                                      </p:cBhvr>
+                                      <p:to>
+                                        <p:strVal val="visible"/>
+                                      </p:to>
+                                    </p:set>
+                                  </p:childTnLst>
+                                </p:cTn>
+                              </p:par>
+                            </p:childTnLst>
+                          </p:cTn>
+                        </p:par>
+                      </p:childTnLst>
+                    </p:cTn>
+                  </p:par>
+                  <p:par>
+                    <p:cTn id="23" fill="hold">
+                      <p:stCondLst>
+                        <p:cond delay="indefinite"/>
+                      </p:stCondLst>
+                      <p:childTnLst>
+                        <p:par>
+                          <p:cTn id="24" fill="hold">
+                            <p:stCondLst>
+                              <p:cond delay="0"/>
+                            </p:stCondLst>
+                            <p:childTnLst>
+                              <p:par>
+                                <p:cTn id="25" presetID="1" presetClass="entr" presetSubtype="0" fill="hold" grpId="0" nodeType="clickEffect">
+                                  <p:stCondLst>
+                                    <p:cond delay="0"/>
+                                  </p:stCondLst>
+                                  <p:childTnLst>
+                                    <p:set>
+                                      <p:cBhvr>
+                                        <p:cTn id="26" dur="1" fill="hold">
+                                          <p:stCondLst>
+                                            <p:cond delay="0"/>
+                                          </p:stCondLst>
+                                        </p:cTn>
+                                        <p:tgtEl>
+                                          <p:spTgt spid="3">
+                                            <p:txEl>
+                                              <p:pRg st="5" end="5"/>
+                                            </p:txEl>
+                                          </p:spTgt>
+                                        </p:tgtEl>
+                                        <p:attrNameLst>
+                                          <p:attrName>style.visibility</p:attrName>
+                                        </p:attrNameLst>
+                                      </p:cBhvr>
+                                      <p:to>
+                                        <p:strVal val="visible"/>
+                                      </p:to>
+                                    </p:set>
+                                  </p:childTnLst>
+                                </p:cTn>
+                              </p:par>
+                            </p:childTnLst>
+                          </p:cTn>
+                        </p:par>
+                      </p:childTnLst>
+                    </p:cTn>
+                  </p:par>
+                  <p:par>
+                    <p:cTn id="27" fill="hold">
+                      <p:stCondLst>
+                        <p:cond delay="indefinite"/>
+                      </p:stCondLst>
+                      <p:childTnLst>
+                        <p:par>
+                          <p:cTn id="28" fill="hold">
+                            <p:stCondLst>
+                              <p:cond delay="0"/>
+                            </p:stCondLst>
+                            <p:childTnLst>
+                              <p:par>
+                                <p:cTn id="29" presetID="1" presetClass="entr" presetSubtype="0" fill="hold" grpId="0" nodeType="clickEffect">
+                                  <p:stCondLst>
+                                    <p:cond delay="0"/>
+                                  </p:stCondLst>
+                                  <p:childTnLst>
+                                    <p:set>
+                                      <p:cBhvr>
+                                        <p:cTn id="30" dur="1" fill="hold">
+                                          <p:stCondLst>
+                                            <p:cond delay="0"/>
+                                          </p:stCondLst>
+                                        </p:cTn>
+                                        <p:tgtEl>
+                                          <p:spTgt spid="3">
+                                            <p:txEl>
+                                              <p:pRg st="6" end="6"/>
+                                            </p:txEl>
+                                          </p:spTgt>
+                                        </p:tgtEl>
+                                        <p:attrNameLst>
+                                          <p:attrName>style.visibility</p:attrName>
+                                        </p:attrNameLst>
+                                      </p:cBhvr>
+                                      <p:to>
+                                        <p:strVal val="visible"/>
+                                      </p:to>
+                                    </p:set>
+                                  </p:childTnLst>
+                                </p:cTn>
+                              </p:par>
+                            </p:childTnLst>
+                          </p:cTn>
+                        </p:par>
+                      </p:childTnLst>
+                    </p:cTn>
+                  </p:par>
+                  <p:par>
+                    <p:cTn id="31" fill="hold">
+                      <p:stCondLst>
+                        <p:cond delay="indefinite"/>
+                      </p:stCondLst>
+                      <p:childTnLst>
+                        <p:par>
+                          <p:cTn id="32" fill="hold">
+                            <p:stCondLst>
+                              <p:cond delay="0"/>
+                            </p:stCondLst>
+                            <p:childTnLst>
+                              <p:par>
+                                <p:cTn id="33" presetID="1" presetClass="entr" presetSubtype="0" fill="hold" grpId="0" nodeType="clickEffect">
+                                  <p:stCondLst>
+                                    <p:cond delay="0"/>
+                                  </p:stCondLst>
+                                  <p:childTnLst>
+                                    <p:set>
+                                      <p:cBhvr>
+                                        <p:cTn id="34" dur="1" fill="hold">
+                                          <p:stCondLst>
+                                            <p:cond delay="0"/>
+                                          </p:stCondLst>
+                                        </p:cTn>
+                                        <p:tgtEl>
+                                          <p:spTgt spid="3">
+                                            <p:txEl>
+                                              <p:pRg st="7" end="7"/>
+                                            </p:txEl>
+                                          </p:spTgt>
+                                        </p:tgtEl>
+                                        <p:attrNameLst>
+                                          <p:attrName>style.visibility</p:attrName>
+                                        </p:attrNameLst>
+                                      </p:cBhvr>
+                                      <p:to>
+                                        <p:strVal val="visible"/>
+                                      </p:to>
+                                    </p:set>
+                                  </p:childTnLst>
+                                </p:cTn>
+                              </p:par>
+                            </p:childTnLst>
+                          </p:cTn>
+                        </p:par>
+                      </p:childTnLst>
+                    </p:cTn>
+                  </p:par>
+                  <p:par>
+                    <p:cTn id="35" fill="hold">
+                      <p:stCondLst>
+                        <p:cond delay="indefinite"/>
+                      </p:stCondLst>
+                      <p:childTnLst>
+                        <p:par>
+                          <p:cTn id="36" fill="hold">
+                            <p:stCondLst>
+                              <p:cond delay="0"/>
+                            </p:stCondLst>
+                            <p:childTnLst>
+                              <p:par>
+                                <p:cTn id="37" presetID="1" presetClass="entr" presetSubtype="0" fill="hold" grpId="0" nodeType="clickEffect">
+                                  <p:stCondLst>
+                                    <p:cond delay="0"/>
+                                  </p:stCondLst>
+                                  <p:childTnLst>
+                                    <p:set>
+                                      <p:cBhvr>
+                                        <p:cTn id="38" dur="1" fill="hold">
+                                          <p:stCondLst>
+                                            <p:cond delay="0"/>
+                                          </p:stCondLst>
+                                        </p:cTn>
+                                        <p:tgtEl>
+                                          <p:spTgt spid="3">
+                                            <p:txEl>
+                                              <p:pRg st="8" end="8"/>
+                                            </p:txEl>
+                                          </p:spTgt>
+                                        </p:tgtEl>
+                                        <p:attrNameLst>
+                                          <p:attrName>style.visibility</p:attrName>
+                                        </p:attrNameLst>
+                                      </p:cBhvr>
+                                      <p:to>
+                                        <p:strVal val="visible"/>
+                                      </p:to>
+                                    </p:set>
+                                  </p:childTnLst>
+                                </p:cTn>
+                              </p:par>
+                            </p:childTnLst>
+                          </p:cTn>
+                        </p:par>
+                      </p:childTnLst>
+                    </p:cTn>
+                  </p:par>
+                </p:childTnLst>
+              </p:cTn>
+              <p:prevCondLst>
+                <p:cond evt="onPrev" delay="0">
+                  <p:tgtEl>
+                    <p:sldTgt/>
+                  </p:tgtEl>
+                </p:cond>
+              </p:prevCondLst>
+              <p:nextCondLst>
+                <p:cond evt="onNext" delay="0">
+                  <p:tgtEl>
+                    <p:sldTgt/>
+                  </p:tgtEl>
+                </p:cond>
+              </p:nextCondLst>
+            </p:seq>
+          </p:childTnLst>
+        </p:cTn>
+      </p:par>
+    </p:tnLst>
+    <p:bldLst>
+      <p:bldP spid="3" grpId="0" uiExpand="1" build="p"/>
+    </p:bldLst>
+  </p:timing>
 </p:sld>
 </file>
 

</xml_diff>